<commit_message>
complete this sprint work for e2e design
</commit_message>
<xml_diff>
--- a/specs/stages/Data Pipeline.pptx
+++ b/specs/stages/Data Pipeline.pptx
@@ -6,14 +6,16 @@
     <p:sldMasterId id="2147483674" r:id="rId3"/>
   </p:sldMasterIdLst>
   <p:notesMasterIdLst>
-    <p:notesMasterId r:id="rId9"/>
+    <p:notesMasterId r:id="rId11"/>
   </p:notesMasterIdLst>
   <p:sldIdLst>
     <p:sldId id="257" r:id="rId4"/>
     <p:sldId id="270" r:id="rId5"/>
     <p:sldId id="271" r:id="rId6"/>
-    <p:sldId id="272" r:id="rId7"/>
-    <p:sldId id="273" r:id="rId8"/>
+    <p:sldId id="274" r:id="rId7"/>
+    <p:sldId id="275" r:id="rId8"/>
+    <p:sldId id="272" r:id="rId9"/>
+    <p:sldId id="273" r:id="rId10"/>
   </p:sldIdLst>
   <p:sldSz cx="9144000" cy="6858000" type="screen4x3"/>
   <p:notesSz cx="6858000" cy="9144000"/>
@@ -197,7 +199,7 @@
           <a:p>
             <a:fld id="{68B00D8E-BD79-47BE-AA74-0D4716B611F1}" type="datetimeFigureOut">
               <a:rPr lang="en-US" smtClean="0"/>
-              <a:t>11/5/2016</a:t>
+              <a:t>11/16/2016</a:t>
             </a:fld>
             <a:endParaRPr lang="en-US"/>
           </a:p>
@@ -554,7 +556,7 @@
             <a:fld id="{81331B57-0BE5-4F82-AA58-76F53EFF3ADA}" type="datetime8">
               <a:rPr lang="en-US" smtClean="0"/>
               <a:pPr/>
-              <a:t>11/5/2016 6:32 PM</a:t>
+              <a:t>11/16/2016 1:02 PM</a:t>
             </a:fld>
             <a:endParaRPr lang="en-US" dirty="0"/>
           </a:p>
@@ -749,7 +751,7 @@
             <a:fld id="{81331B57-0BE5-4F82-AA58-76F53EFF3ADA}" type="datetime8">
               <a:rPr lang="en-US" smtClean="0"/>
               <a:pPr/>
-              <a:t>11/5/2016 6:32 PM</a:t>
+              <a:t>11/16/2016 1:02 PM</a:t>
             </a:fld>
             <a:endParaRPr lang="en-US"/>
           </a:p>
@@ -934,7 +936,7 @@
             <a:fld id="{81331B57-0BE5-4F82-AA58-76F53EFF3ADA}" type="datetime8">
               <a:rPr lang="en-US" smtClean="0"/>
               <a:pPr/>
-              <a:t>11/5/2016 6:32 PM</a:t>
+              <a:t>11/16/2016 1:02 PM</a:t>
             </a:fld>
             <a:endParaRPr lang="en-US"/>
           </a:p>
@@ -1119,7 +1121,7 @@
             <a:fld id="{81331B57-0BE5-4F82-AA58-76F53EFF3ADA}" type="datetime8">
               <a:rPr lang="en-US" smtClean="0"/>
               <a:pPr/>
-              <a:t>11/5/2016 6:32 PM</a:t>
+              <a:t>11/16/2016 1:12 PM</a:t>
             </a:fld>
             <a:endParaRPr lang="en-US"/>
           </a:p>
@@ -1304,7 +1306,7 @@
             <a:fld id="{81331B57-0BE5-4F82-AA58-76F53EFF3ADA}" type="datetime8">
               <a:rPr lang="en-US" smtClean="0"/>
               <a:pPr/>
-              <a:t>11/5/2016 6:32 PM</a:t>
+              <a:t>11/16/2016 1:18 PM</a:t>
             </a:fld>
             <a:endParaRPr lang="en-US"/>
           </a:p>
@@ -1389,6 +1391,376 @@
               <a:rPr lang="en-US" smtClean="0"/>
               <a:pPr/>
               <a:t>5</a:t>
+            </a:fld>
+            <a:endParaRPr lang="en-US" dirty="0"/>
+          </a:p>
+        </p:txBody>
+      </p:sp>
+    </p:spTree>
+  </p:cSld>
+  <p:clrMapOvr>
+    <a:masterClrMapping/>
+  </p:clrMapOvr>
+</p:notes>
+</file>
+
+<file path=ppt/notesSlides/notesSlide6.xml><?xml version="1.0" encoding="utf-8"?>
+<p:notes xmlns:a="http://schemas.openxmlformats.org/drawingml/2006/main" xmlns:r="http://schemas.openxmlformats.org/officeDocument/2006/relationships" xmlns:p="http://schemas.openxmlformats.org/presentationml/2006/main">
+  <p:cSld>
+    <p:spTree>
+      <p:nvGrpSpPr>
+        <p:cNvPr id="1" name=""/>
+        <p:cNvGrpSpPr/>
+        <p:nvPr/>
+      </p:nvGrpSpPr>
+      <p:grpSpPr>
+        <a:xfrm>
+          <a:off x="0" y="0"/>
+          <a:ext cx="0" cy="0"/>
+          <a:chOff x="0" y="0"/>
+          <a:chExt cx="0" cy="0"/>
+        </a:xfrm>
+      </p:grpSpPr>
+      <p:sp>
+        <p:nvSpPr>
+          <p:cNvPr id="2" name="Slide Image Placeholder 1"/>
+          <p:cNvSpPr>
+            <a:spLocks noGrp="1" noRot="1" noChangeAspect="1"/>
+          </p:cNvSpPr>
+          <p:nvPr>
+            <p:ph type="sldImg"/>
+          </p:nvPr>
+        </p:nvSpPr>
+        <p:spPr/>
+      </p:sp>
+      <p:sp>
+        <p:nvSpPr>
+          <p:cNvPr id="3" name="Notes Placeholder 2"/>
+          <p:cNvSpPr>
+            <a:spLocks noGrp="1"/>
+          </p:cNvSpPr>
+          <p:nvPr>
+            <p:ph type="body" idx="1"/>
+          </p:nvPr>
+        </p:nvSpPr>
+        <p:spPr/>
+        <p:txBody>
+          <a:bodyPr>
+            <a:normAutofit/>
+          </a:bodyPr>
+          <a:lstStyle/>
+          <a:p>
+            <a:endParaRPr lang="en-US"/>
+          </a:p>
+        </p:txBody>
+      </p:sp>
+      <p:sp>
+        <p:nvSpPr>
+          <p:cNvPr id="4" name="Header Placeholder 3"/>
+          <p:cNvSpPr>
+            <a:spLocks noGrp="1"/>
+          </p:cNvSpPr>
+          <p:nvPr>
+            <p:ph type="hdr" sz="quarter" idx="10"/>
+          </p:nvPr>
+        </p:nvSpPr>
+        <p:spPr/>
+        <p:txBody>
+          <a:bodyPr/>
+          <a:lstStyle/>
+          <a:p>
+            <a:endParaRPr lang="en-US" dirty="0"/>
+          </a:p>
+        </p:txBody>
+      </p:sp>
+      <p:sp>
+        <p:nvSpPr>
+          <p:cNvPr id="5" name="Date Placeholder 4"/>
+          <p:cNvSpPr>
+            <a:spLocks noGrp="1"/>
+          </p:cNvSpPr>
+          <p:nvPr>
+            <p:ph type="dt" idx="11"/>
+          </p:nvPr>
+        </p:nvSpPr>
+        <p:spPr/>
+        <p:txBody>
+          <a:bodyPr/>
+          <a:lstStyle/>
+          <a:p>
+            <a:fld id="{81331B57-0BE5-4F82-AA58-76F53EFF3ADA}" type="datetime8">
+              <a:rPr lang="en-US" smtClean="0"/>
+              <a:pPr/>
+              <a:t>11/16/2016 1:02 PM</a:t>
+            </a:fld>
+            <a:endParaRPr lang="en-US"/>
+          </a:p>
+        </p:txBody>
+      </p:sp>
+      <p:sp>
+        <p:nvSpPr>
+          <p:cNvPr id="6" name="Footer Placeholder 5"/>
+          <p:cNvSpPr>
+            <a:spLocks noGrp="1"/>
+          </p:cNvSpPr>
+          <p:nvPr>
+            <p:ph type="ftr" sz="quarter" idx="12"/>
+          </p:nvPr>
+        </p:nvSpPr>
+        <p:spPr/>
+        <p:txBody>
+          <a:bodyPr/>
+          <a:lstStyle/>
+          <a:p>
+            <a:r>
+              <a:rPr lang="en-US" dirty="0" smtClean="0">
+                <a:solidFill>
+                  <a:srgbClr val="000000"/>
+                </a:solidFill>
+                <a:latin typeface="Trebuchet MS" pitchFamily="34" charset="0"/>
+              </a:rPr>
+              <a:t>© 2007 Microsoft Corporation. All rights reserved. Microsoft, Windows, Windows Vista and other product names are or may be registered trademarks and/or trademarks in the U.S. and/or other countries.</a:t>
+            </a:r>
+          </a:p>
+          <a:p>
+            <a:r>
+              <a:rPr lang="en-US" dirty="0" smtClean="0">
+                <a:solidFill>
+                  <a:srgbClr val="000000"/>
+                </a:solidFill>
+                <a:latin typeface="Trebuchet MS" pitchFamily="34" charset="0"/>
+              </a:rPr>
+              <a:t>The information herein is for informational purposes only and represents the current view of Microsoft Corporation as of the date of this presentation.  Because Microsoft must respond to changing market conditions, it should not be interpreted to be a commitment on the part of Microsoft, and Microsoft cannot guarantee the accuracy of any information provided after the date of this presentation.  </a:t>
+            </a:r>
+            <a:br>
+              <a:rPr lang="en-US" dirty="0" smtClean="0">
+                <a:solidFill>
+                  <a:srgbClr val="000000"/>
+                </a:solidFill>
+                <a:latin typeface="Trebuchet MS" pitchFamily="34" charset="0"/>
+              </a:rPr>
+            </a:br>
+            <a:r>
+              <a:rPr lang="en-US" dirty="0" smtClean="0">
+                <a:solidFill>
+                  <a:srgbClr val="000000"/>
+                </a:solidFill>
+                <a:latin typeface="Trebuchet MS" pitchFamily="34" charset="0"/>
+              </a:rPr>
+              <a:t>MICROSOFT MAKES NO WARRANTIES, EXPRESS, IMPLIED OR STATUTORY, AS TO THE INFORMATION IN THIS PRESENTATION.</a:t>
+            </a:r>
+          </a:p>
+          <a:p>
+            <a:endParaRPr lang="en-US" dirty="0">
+              <a:latin typeface="Trebuchet MS" pitchFamily="34" charset="0"/>
+            </a:endParaRPr>
+          </a:p>
+        </p:txBody>
+      </p:sp>
+      <p:sp>
+        <p:nvSpPr>
+          <p:cNvPr id="7" name="Slide Number Placeholder 6"/>
+          <p:cNvSpPr>
+            <a:spLocks noGrp="1"/>
+          </p:cNvSpPr>
+          <p:nvPr>
+            <p:ph type="sldNum" sz="quarter" idx="13"/>
+          </p:nvPr>
+        </p:nvSpPr>
+        <p:spPr/>
+        <p:txBody>
+          <a:bodyPr/>
+          <a:lstStyle/>
+          <a:p>
+            <a:fld id="{EC87E0CF-87F6-4B58-B8B8-DCAB2DAAF3CA}" type="slidenum">
+              <a:rPr lang="en-US" smtClean="0"/>
+              <a:pPr/>
+              <a:t>6</a:t>
+            </a:fld>
+            <a:endParaRPr lang="en-US" dirty="0"/>
+          </a:p>
+        </p:txBody>
+      </p:sp>
+    </p:spTree>
+  </p:cSld>
+  <p:clrMapOvr>
+    <a:masterClrMapping/>
+  </p:clrMapOvr>
+</p:notes>
+</file>
+
+<file path=ppt/notesSlides/notesSlide7.xml><?xml version="1.0" encoding="utf-8"?>
+<p:notes xmlns:a="http://schemas.openxmlformats.org/drawingml/2006/main" xmlns:r="http://schemas.openxmlformats.org/officeDocument/2006/relationships" xmlns:p="http://schemas.openxmlformats.org/presentationml/2006/main">
+  <p:cSld>
+    <p:spTree>
+      <p:nvGrpSpPr>
+        <p:cNvPr id="1" name=""/>
+        <p:cNvGrpSpPr/>
+        <p:nvPr/>
+      </p:nvGrpSpPr>
+      <p:grpSpPr>
+        <a:xfrm>
+          <a:off x="0" y="0"/>
+          <a:ext cx="0" cy="0"/>
+          <a:chOff x="0" y="0"/>
+          <a:chExt cx="0" cy="0"/>
+        </a:xfrm>
+      </p:grpSpPr>
+      <p:sp>
+        <p:nvSpPr>
+          <p:cNvPr id="2" name="Slide Image Placeholder 1"/>
+          <p:cNvSpPr>
+            <a:spLocks noGrp="1" noRot="1" noChangeAspect="1"/>
+          </p:cNvSpPr>
+          <p:nvPr>
+            <p:ph type="sldImg"/>
+          </p:nvPr>
+        </p:nvSpPr>
+        <p:spPr/>
+      </p:sp>
+      <p:sp>
+        <p:nvSpPr>
+          <p:cNvPr id="3" name="Notes Placeholder 2"/>
+          <p:cNvSpPr>
+            <a:spLocks noGrp="1"/>
+          </p:cNvSpPr>
+          <p:nvPr>
+            <p:ph type="body" idx="1"/>
+          </p:nvPr>
+        </p:nvSpPr>
+        <p:spPr/>
+        <p:txBody>
+          <a:bodyPr>
+            <a:normAutofit/>
+          </a:bodyPr>
+          <a:lstStyle/>
+          <a:p>
+            <a:endParaRPr lang="en-US"/>
+          </a:p>
+        </p:txBody>
+      </p:sp>
+      <p:sp>
+        <p:nvSpPr>
+          <p:cNvPr id="4" name="Header Placeholder 3"/>
+          <p:cNvSpPr>
+            <a:spLocks noGrp="1"/>
+          </p:cNvSpPr>
+          <p:nvPr>
+            <p:ph type="hdr" sz="quarter" idx="10"/>
+          </p:nvPr>
+        </p:nvSpPr>
+        <p:spPr/>
+        <p:txBody>
+          <a:bodyPr/>
+          <a:lstStyle/>
+          <a:p>
+            <a:endParaRPr lang="en-US" dirty="0"/>
+          </a:p>
+        </p:txBody>
+      </p:sp>
+      <p:sp>
+        <p:nvSpPr>
+          <p:cNvPr id="5" name="Date Placeholder 4"/>
+          <p:cNvSpPr>
+            <a:spLocks noGrp="1"/>
+          </p:cNvSpPr>
+          <p:nvPr>
+            <p:ph type="dt" idx="11"/>
+          </p:nvPr>
+        </p:nvSpPr>
+        <p:spPr/>
+        <p:txBody>
+          <a:bodyPr/>
+          <a:lstStyle/>
+          <a:p>
+            <a:fld id="{81331B57-0BE5-4F82-AA58-76F53EFF3ADA}" type="datetime8">
+              <a:rPr lang="en-US" smtClean="0"/>
+              <a:pPr/>
+              <a:t>11/16/2016 1:02 PM</a:t>
+            </a:fld>
+            <a:endParaRPr lang="en-US"/>
+          </a:p>
+        </p:txBody>
+      </p:sp>
+      <p:sp>
+        <p:nvSpPr>
+          <p:cNvPr id="6" name="Footer Placeholder 5"/>
+          <p:cNvSpPr>
+            <a:spLocks noGrp="1"/>
+          </p:cNvSpPr>
+          <p:nvPr>
+            <p:ph type="ftr" sz="quarter" idx="12"/>
+          </p:nvPr>
+        </p:nvSpPr>
+        <p:spPr/>
+        <p:txBody>
+          <a:bodyPr/>
+          <a:lstStyle/>
+          <a:p>
+            <a:r>
+              <a:rPr lang="en-US" dirty="0" smtClean="0">
+                <a:solidFill>
+                  <a:srgbClr val="000000"/>
+                </a:solidFill>
+                <a:latin typeface="Trebuchet MS" pitchFamily="34" charset="0"/>
+              </a:rPr>
+              <a:t>© 2007 Microsoft Corporation. All rights reserved. Microsoft, Windows, Windows Vista and other product names are or may be registered trademarks and/or trademarks in the U.S. and/or other countries.</a:t>
+            </a:r>
+          </a:p>
+          <a:p>
+            <a:r>
+              <a:rPr lang="en-US" dirty="0" smtClean="0">
+                <a:solidFill>
+                  <a:srgbClr val="000000"/>
+                </a:solidFill>
+                <a:latin typeface="Trebuchet MS" pitchFamily="34" charset="0"/>
+              </a:rPr>
+              <a:t>The information herein is for informational purposes only and represents the current view of Microsoft Corporation as of the date of this presentation.  Because Microsoft must respond to changing market conditions, it should not be interpreted to be a commitment on the part of Microsoft, and Microsoft cannot guarantee the accuracy of any information provided after the date of this presentation.  </a:t>
+            </a:r>
+            <a:br>
+              <a:rPr lang="en-US" dirty="0" smtClean="0">
+                <a:solidFill>
+                  <a:srgbClr val="000000"/>
+                </a:solidFill>
+                <a:latin typeface="Trebuchet MS" pitchFamily="34" charset="0"/>
+              </a:rPr>
+            </a:br>
+            <a:r>
+              <a:rPr lang="en-US" dirty="0" smtClean="0">
+                <a:solidFill>
+                  <a:srgbClr val="000000"/>
+                </a:solidFill>
+                <a:latin typeface="Trebuchet MS" pitchFamily="34" charset="0"/>
+              </a:rPr>
+              <a:t>MICROSOFT MAKES NO WARRANTIES, EXPRESS, IMPLIED OR STATUTORY, AS TO THE INFORMATION IN THIS PRESENTATION.</a:t>
+            </a:r>
+          </a:p>
+          <a:p>
+            <a:endParaRPr lang="en-US" dirty="0">
+              <a:latin typeface="Trebuchet MS" pitchFamily="34" charset="0"/>
+            </a:endParaRPr>
+          </a:p>
+        </p:txBody>
+      </p:sp>
+      <p:sp>
+        <p:nvSpPr>
+          <p:cNvPr id="7" name="Slide Number Placeholder 6"/>
+          <p:cNvSpPr>
+            <a:spLocks noGrp="1"/>
+          </p:cNvSpPr>
+          <p:nvPr>
+            <p:ph type="sldNum" sz="quarter" idx="13"/>
+          </p:nvPr>
+        </p:nvSpPr>
+        <p:spPr/>
+        <p:txBody>
+          <a:bodyPr/>
+          <a:lstStyle/>
+          <a:p>
+            <a:fld id="{EC87E0CF-87F6-4B58-B8B8-DCAB2DAAF3CA}" type="slidenum">
+              <a:rPr lang="en-US" smtClean="0"/>
+              <a:pPr/>
+              <a:t>7</a:t>
             </a:fld>
             <a:endParaRPr lang="en-US" dirty="0"/>
           </a:p>
@@ -4662,7 +5034,15 @@
           <a:p>
             <a:r>
               <a:rPr lang="en-US" dirty="0" smtClean="0"/>
-              <a:t>Nov 5, 2016</a:t>
+              <a:t>Nov </a:t>
+            </a:r>
+            <a:r>
+              <a:rPr lang="en-US" dirty="0" smtClean="0"/>
+              <a:t>16, </a:t>
+            </a:r>
+            <a:r>
+              <a:rPr lang="en-US" dirty="0" smtClean="0"/>
+              <a:t>2016</a:t>
             </a:r>
           </a:p>
         </p:txBody>
@@ -6104,15 +6484,7 @@
           <a:p>
             <a:r>
               <a:rPr lang="en-US" dirty="0" smtClean="0"/>
-              <a:t>Stages (</a:t>
-            </a:r>
-            <a:r>
-              <a:rPr lang="en-US" dirty="0" err="1" smtClean="0"/>
-              <a:t>cont</a:t>
-            </a:r>
-            <a:r>
-              <a:rPr lang="en-US" dirty="0" smtClean="0"/>
-              <a:t>)</a:t>
+              <a:t>Input Stage</a:t>
             </a:r>
             <a:endParaRPr lang="en-US" dirty="0"/>
           </a:p>
@@ -6130,64 +6502,13 @@
         </p:nvSpPr>
         <p:spPr>
           <a:xfrm>
-            <a:off x="381000" y="1096423"/>
-            <a:ext cx="8382000" cy="7263527"/>
+            <a:off x="304606" y="1502076"/>
+            <a:ext cx="8382000" cy="4593923"/>
           </a:xfrm>
         </p:spPr>
         <p:txBody>
           <a:bodyPr/>
           <a:lstStyle/>
-          <a:p>
-            <a:r>
-              <a:rPr lang="en-US" dirty="0" smtClean="0">
-                <a:solidFill>
-                  <a:schemeClr val="tx2">
-                    <a:lumMod val="50000"/>
-                  </a:schemeClr>
-                </a:solidFill>
-              </a:rPr>
-              <a:t>Data Model</a:t>
-            </a:r>
-          </a:p>
-          <a:p>
-            <a:pPr lvl="1"/>
-            <a:r>
-              <a:rPr lang="en-US" dirty="0" smtClean="0">
-                <a:solidFill>
-                  <a:schemeClr val="tx1">
-                    <a:lumMod val="95000"/>
-                  </a:schemeClr>
-                </a:solidFill>
-              </a:rPr>
-              <a:t>Transform from input formats to internal representation</a:t>
-            </a:r>
-          </a:p>
-          <a:p>
-            <a:pPr lvl="1"/>
-            <a:r>
-              <a:rPr lang="en-US" dirty="0" smtClean="0">
-                <a:solidFill>
-                  <a:schemeClr val="tx1">
-                    <a:lumMod val="95000"/>
-                  </a:schemeClr>
-                </a:solidFill>
-              </a:rPr>
-              <a:t>Data Wrangling</a:t>
-            </a:r>
-          </a:p>
-          <a:p>
-            <a:pPr lvl="1"/>
-            <a:r>
-              <a:rPr lang="en-US" dirty="0" smtClean="0">
-                <a:solidFill>
-                  <a:schemeClr val="tx1">
-                    <a:lumMod val="95000"/>
-                  </a:schemeClr>
-                </a:solidFill>
-              </a:rPr>
-              <a:t>Data Manipulation</a:t>
-            </a:r>
-          </a:p>
           <a:p>
             <a:pPr marL="0" indent="0">
               <a:buNone/>
@@ -6195,83 +6516,991 @@
             <a:endParaRPr lang="en-US" dirty="0" smtClean="0"/>
           </a:p>
           <a:p>
-            <a:r>
-              <a:rPr lang="en-US" dirty="0" smtClean="0">
-                <a:solidFill>
-                  <a:schemeClr val="tx2">
-                    <a:lumMod val="50000"/>
-                  </a:schemeClr>
-                </a:solidFill>
+            <a:pPr marL="0" indent="0">
+              <a:buNone/>
+            </a:pPr>
+            <a:endParaRPr lang="en-US" dirty="0"/>
+          </a:p>
+          <a:p>
+            <a:pPr marL="0" indent="0">
+              <a:buNone/>
+            </a:pPr>
+            <a:endParaRPr lang="en-US" dirty="0" smtClean="0"/>
+          </a:p>
+          <a:p>
+            <a:pPr marL="0" indent="0">
+              <a:buNone/>
+            </a:pPr>
+            <a:endParaRPr lang="en-US" dirty="0"/>
+          </a:p>
+          <a:p>
+            <a:pPr marL="0" indent="0">
+              <a:buNone/>
+            </a:pPr>
+            <a:endParaRPr lang="en-US" dirty="0" smtClean="0"/>
+          </a:p>
+          <a:p>
+            <a:pPr marL="0" indent="0">
+              <a:buNone/>
+            </a:pPr>
+            <a:endParaRPr lang="en-US" dirty="0"/>
+          </a:p>
+          <a:p>
+            <a:pPr marL="0" indent="0">
+              <a:buNone/>
+            </a:pPr>
+            <a:endParaRPr lang="en-US" dirty="0" smtClean="0"/>
+          </a:p>
+          <a:p>
+            <a:pPr marL="0" indent="0">
+              <a:buNone/>
+            </a:pPr>
+            <a:endParaRPr lang="en-US" dirty="0" smtClean="0"/>
+          </a:p>
+        </p:txBody>
+      </p:sp>
+      <p:sp>
+        <p:nvSpPr>
+          <p:cNvPr id="4" name="Rounded Rectangle 3"/>
+          <p:cNvSpPr/>
+          <p:nvPr/>
+        </p:nvSpPr>
+        <p:spPr bwMode="auto">
+          <a:xfrm>
+            <a:off x="1219200" y="2524394"/>
+            <a:ext cx="2057400" cy="1219200"/>
+          </a:xfrm>
+          <a:prstGeom prst="roundRect">
+            <a:avLst/>
+          </a:prstGeom>
+          <a:solidFill>
+            <a:schemeClr val="accent1"/>
+          </a:solidFill>
+          <a:ln>
+            <a:headEnd type="none" w="med" len="med"/>
+            <a:tailEnd type="none" w="med" len="med"/>
+          </a:ln>
+        </p:spPr>
+        <p:style>
+          <a:lnRef idx="0">
+            <a:schemeClr val="accent2"/>
+          </a:lnRef>
+          <a:fillRef idx="3">
+            <a:schemeClr val="accent2"/>
+          </a:fillRef>
+          <a:effectRef idx="3">
+            <a:schemeClr val="accent2"/>
+          </a:effectRef>
+          <a:fontRef idx="minor">
+            <a:schemeClr val="lt1"/>
+          </a:fontRef>
+        </p:style>
+        <p:txBody>
+          <a:bodyPr vert="horz" wrap="square" lIns="91436" tIns="45718" rIns="91436" bIns="45718" numCol="1" rtlCol="0" anchor="ctr" anchorCtr="0" compatLnSpc="1">
+            <a:prstTxWarp prst="textNoShape">
+              <a:avLst/>
+            </a:prstTxWarp>
+          </a:bodyPr>
+          <a:lstStyle/>
+          <a:p>
+            <a:pPr algn="ctr" defTabSz="914099" fontAlgn="base">
+              <a:spcBef>
+                <a:spcPct val="0"/>
+              </a:spcBef>
+              <a:spcAft>
+                <a:spcPct val="0"/>
+              </a:spcAft>
+            </a:pPr>
+            <a:r>
+              <a:rPr lang="en-US" sz="2300" dirty="0" smtClean="0">
+                <a:solidFill>
+                  <a:srgbClr val="FFFFFF"/>
+                </a:solidFill>
+                <a:effectLst>
+                  <a:outerShdw blurRad="38100" dist="38100" dir="2700000" algn="tl">
+                    <a:srgbClr val="000000">
+                      <a:alpha val="43137"/>
+                    </a:srgbClr>
+                  </a:outerShdw>
+                </a:effectLst>
+                <a:latin typeface="Trebuchet MS" pitchFamily="34" charset="0"/>
               </a:rPr>
-              <a:t>Data Store</a:t>
-            </a:r>
-          </a:p>
-          <a:p>
-            <a:pPr lvl="1"/>
+              <a:t>Parse</a:t>
+            </a:r>
+            <a:endParaRPr lang="en-US" sz="2300" dirty="0" smtClean="0">
+              <a:solidFill>
+                <a:srgbClr val="FFFFFF"/>
+              </a:solidFill>
+              <a:effectLst>
+                <a:outerShdw blurRad="38100" dist="38100" dir="2700000" algn="tl">
+                  <a:srgbClr val="000000">
+                    <a:alpha val="43137"/>
+                  </a:srgbClr>
+                </a:outerShdw>
+              </a:effectLst>
+              <a:latin typeface="Trebuchet MS" pitchFamily="34" charset="0"/>
+            </a:endParaRPr>
+          </a:p>
+        </p:txBody>
+      </p:sp>
+      <p:sp>
+        <p:nvSpPr>
+          <p:cNvPr id="5" name="Rounded Rectangle 4"/>
+          <p:cNvSpPr/>
+          <p:nvPr/>
+        </p:nvSpPr>
+        <p:spPr bwMode="auto">
+          <a:xfrm>
+            <a:off x="3657988" y="2549166"/>
+            <a:ext cx="2057400" cy="1219200"/>
+          </a:xfrm>
+          <a:prstGeom prst="roundRect">
+            <a:avLst/>
+          </a:prstGeom>
+          <a:solidFill>
+            <a:schemeClr val="accent1"/>
+          </a:solidFill>
+          <a:ln>
+            <a:headEnd type="none" w="med" len="med"/>
+            <a:tailEnd type="none" w="med" len="med"/>
+          </a:ln>
+        </p:spPr>
+        <p:style>
+          <a:lnRef idx="0">
+            <a:schemeClr val="accent2"/>
+          </a:lnRef>
+          <a:fillRef idx="3">
+            <a:schemeClr val="accent2"/>
+          </a:fillRef>
+          <a:effectRef idx="3">
+            <a:schemeClr val="accent2"/>
+          </a:effectRef>
+          <a:fontRef idx="minor">
+            <a:schemeClr val="lt1"/>
+          </a:fontRef>
+        </p:style>
+        <p:txBody>
+          <a:bodyPr vert="horz" wrap="square" lIns="91436" tIns="45718" rIns="91436" bIns="45718" numCol="1" rtlCol="0" anchor="ctr" anchorCtr="0" compatLnSpc="1">
+            <a:prstTxWarp prst="textNoShape">
+              <a:avLst/>
+            </a:prstTxWarp>
+          </a:bodyPr>
+          <a:lstStyle/>
+          <a:p>
+            <a:pPr algn="ctr" defTabSz="914099" fontAlgn="base">
+              <a:spcBef>
+                <a:spcPct val="0"/>
+              </a:spcBef>
+              <a:spcAft>
+                <a:spcPct val="0"/>
+              </a:spcAft>
+            </a:pPr>
+            <a:r>
+              <a:rPr lang="en-US" sz="2300" dirty="0" smtClean="0">
+                <a:solidFill>
+                  <a:srgbClr val="FFFFFF"/>
+                </a:solidFill>
+                <a:effectLst>
+                  <a:outerShdw blurRad="38100" dist="38100" dir="2700000" algn="tl">
+                    <a:srgbClr val="000000">
+                      <a:alpha val="43137"/>
+                    </a:srgbClr>
+                  </a:outerShdw>
+                </a:effectLst>
+                <a:latin typeface="Trebuchet MS" pitchFamily="34" charset="0"/>
+              </a:rPr>
+              <a:t>Collection</a:t>
+            </a:r>
+            <a:endParaRPr lang="en-US" sz="2300" dirty="0" smtClean="0">
+              <a:solidFill>
+                <a:srgbClr val="FFFFFF"/>
+              </a:solidFill>
+              <a:effectLst>
+                <a:outerShdw blurRad="38100" dist="38100" dir="2700000" algn="tl">
+                  <a:srgbClr val="000000">
+                    <a:alpha val="43137"/>
+                  </a:srgbClr>
+                </a:outerShdw>
+              </a:effectLst>
+              <a:latin typeface="Trebuchet MS" pitchFamily="34" charset="0"/>
+            </a:endParaRPr>
+          </a:p>
+        </p:txBody>
+      </p:sp>
+      <p:sp>
+        <p:nvSpPr>
+          <p:cNvPr id="10" name="Rounded Rectangle 9"/>
+          <p:cNvSpPr/>
+          <p:nvPr/>
+        </p:nvSpPr>
+        <p:spPr bwMode="auto">
+          <a:xfrm>
+            <a:off x="6096388" y="2524394"/>
+            <a:ext cx="2057400" cy="1219200"/>
+          </a:xfrm>
+          <a:prstGeom prst="roundRect">
+            <a:avLst/>
+          </a:prstGeom>
+          <a:solidFill>
+            <a:schemeClr val="accent1"/>
+          </a:solidFill>
+          <a:ln>
+            <a:headEnd type="none" w="med" len="med"/>
+            <a:tailEnd type="none" w="med" len="med"/>
+          </a:ln>
+        </p:spPr>
+        <p:style>
+          <a:lnRef idx="0">
+            <a:schemeClr val="accent2"/>
+          </a:lnRef>
+          <a:fillRef idx="3">
+            <a:schemeClr val="accent2"/>
+          </a:fillRef>
+          <a:effectRef idx="3">
+            <a:schemeClr val="accent2"/>
+          </a:effectRef>
+          <a:fontRef idx="minor">
+            <a:schemeClr val="lt1"/>
+          </a:fontRef>
+        </p:style>
+        <p:txBody>
+          <a:bodyPr vert="horz" wrap="square" lIns="91436" tIns="45718" rIns="91436" bIns="45718" numCol="1" rtlCol="0" anchor="ctr" anchorCtr="0" compatLnSpc="1">
+            <a:prstTxWarp prst="textNoShape">
+              <a:avLst/>
+            </a:prstTxWarp>
+          </a:bodyPr>
+          <a:lstStyle/>
+          <a:p>
+            <a:pPr algn="ctr" defTabSz="914099" fontAlgn="base">
+              <a:spcBef>
+                <a:spcPct val="0"/>
+              </a:spcBef>
+              <a:spcAft>
+                <a:spcPct val="0"/>
+              </a:spcAft>
+            </a:pPr>
+            <a:r>
+              <a:rPr lang="en-US" sz="2300" dirty="0" smtClean="0">
+                <a:solidFill>
+                  <a:srgbClr val="FFFFFF"/>
+                </a:solidFill>
+                <a:effectLst>
+                  <a:outerShdw blurRad="38100" dist="38100" dir="2700000" algn="tl">
+                    <a:srgbClr val="000000">
+                      <a:alpha val="43137"/>
+                    </a:srgbClr>
+                  </a:outerShdw>
+                </a:effectLst>
+                <a:latin typeface="Trebuchet MS" pitchFamily="34" charset="0"/>
+              </a:rPr>
+              <a:t>Schema</a:t>
+            </a:r>
+            <a:endParaRPr lang="en-US" sz="2300" dirty="0" smtClean="0">
+              <a:solidFill>
+                <a:srgbClr val="FFFFFF"/>
+              </a:solidFill>
+              <a:effectLst>
+                <a:outerShdw blurRad="38100" dist="38100" dir="2700000" algn="tl">
+                  <a:srgbClr val="000000">
+                    <a:alpha val="43137"/>
+                  </a:srgbClr>
+                </a:outerShdw>
+              </a:effectLst>
+              <a:latin typeface="Trebuchet MS" pitchFamily="34" charset="0"/>
+            </a:endParaRPr>
+          </a:p>
+        </p:txBody>
+      </p:sp>
+      <p:cxnSp>
+        <p:nvCxnSpPr>
+          <p:cNvPr id="21" name="Straight Connector 20"/>
+          <p:cNvCxnSpPr/>
+          <p:nvPr/>
+        </p:nvCxnSpPr>
+        <p:spPr>
+          <a:xfrm flipH="1">
+            <a:off x="2247900" y="2023357"/>
+            <a:ext cx="4838700" cy="0"/>
+          </a:xfrm>
+          <a:prstGeom prst="line">
+            <a:avLst/>
+          </a:prstGeom>
+          <a:ln w="38100"/>
+        </p:spPr>
+        <p:style>
+          <a:lnRef idx="1">
+            <a:schemeClr val="accent1"/>
+          </a:lnRef>
+          <a:fillRef idx="0">
+            <a:schemeClr val="accent1"/>
+          </a:fillRef>
+          <a:effectRef idx="0">
+            <a:schemeClr val="accent1"/>
+          </a:effectRef>
+          <a:fontRef idx="minor">
+            <a:schemeClr val="tx1"/>
+          </a:fontRef>
+        </p:style>
+      </p:cxnSp>
+      <p:cxnSp>
+        <p:nvCxnSpPr>
+          <p:cNvPr id="24" name="Straight Arrow Connector 23"/>
+          <p:cNvCxnSpPr/>
+          <p:nvPr/>
+        </p:nvCxnSpPr>
+        <p:spPr>
+          <a:xfrm>
+            <a:off x="7086599" y="2023357"/>
+            <a:ext cx="1" cy="501037"/>
+          </a:xfrm>
+          <a:prstGeom prst="straightConnector1">
+            <a:avLst/>
+          </a:prstGeom>
+          <a:ln w="38100">
+            <a:tailEnd type="arrow"/>
+          </a:ln>
+        </p:spPr>
+        <p:style>
+          <a:lnRef idx="1">
+            <a:schemeClr val="accent1"/>
+          </a:lnRef>
+          <a:fillRef idx="0">
+            <a:schemeClr val="accent1"/>
+          </a:fillRef>
+          <a:effectRef idx="0">
+            <a:schemeClr val="accent1"/>
+          </a:effectRef>
+          <a:fontRef idx="minor">
+            <a:schemeClr val="tx1"/>
+          </a:fontRef>
+        </p:style>
+      </p:cxnSp>
+      <p:sp>
+        <p:nvSpPr>
+          <p:cNvPr id="17" name="Left Arrow 16"/>
+          <p:cNvSpPr/>
+          <p:nvPr/>
+        </p:nvSpPr>
+        <p:spPr bwMode="auto">
+          <a:xfrm>
+            <a:off x="3276600" y="2960839"/>
+            <a:ext cx="381388" cy="381002"/>
+          </a:xfrm>
+          <a:prstGeom prst="leftArrow">
+            <a:avLst/>
+          </a:prstGeom>
+          <a:solidFill>
+            <a:schemeClr val="accent1"/>
+          </a:solidFill>
+          <a:ln>
+            <a:headEnd type="none" w="med" len="med"/>
+            <a:tailEnd type="none" w="med" len="med"/>
+          </a:ln>
+        </p:spPr>
+        <p:style>
+          <a:lnRef idx="0">
+            <a:schemeClr val="accent2"/>
+          </a:lnRef>
+          <a:fillRef idx="3">
+            <a:schemeClr val="accent2"/>
+          </a:fillRef>
+          <a:effectRef idx="3">
+            <a:schemeClr val="accent2"/>
+          </a:effectRef>
+          <a:fontRef idx="minor">
+            <a:schemeClr val="lt1"/>
+          </a:fontRef>
+        </p:style>
+        <p:txBody>
+          <a:bodyPr vert="horz" wrap="square" lIns="91436" tIns="45718" rIns="91436" bIns="45718" numCol="1" rtlCol="0" anchor="ctr" anchorCtr="0" compatLnSpc="1">
+            <a:prstTxWarp prst="textNoShape">
+              <a:avLst/>
+            </a:prstTxWarp>
+          </a:bodyPr>
+          <a:lstStyle/>
+          <a:p>
+            <a:pPr algn="ctr" defTabSz="914099" fontAlgn="base">
+              <a:spcBef>
+                <a:spcPct val="0"/>
+              </a:spcBef>
+              <a:spcAft>
+                <a:spcPct val="0"/>
+              </a:spcAft>
+            </a:pPr>
+            <a:endParaRPr lang="en-US" sz="2300" dirty="0" smtClean="0">
+              <a:solidFill>
+                <a:srgbClr val="FFFFFF"/>
+              </a:solidFill>
+              <a:effectLst>
+                <a:outerShdw blurRad="38100" dist="38100" dir="2700000" algn="tl">
+                  <a:srgbClr val="000000">
+                    <a:alpha val="43137"/>
+                  </a:srgbClr>
+                </a:outerShdw>
+              </a:effectLst>
+              <a:latin typeface="Trebuchet MS" pitchFamily="34" charset="0"/>
+            </a:endParaRPr>
+          </a:p>
+        </p:txBody>
+      </p:sp>
+      <p:sp>
+        <p:nvSpPr>
+          <p:cNvPr id="22" name="Left Arrow 21"/>
+          <p:cNvSpPr/>
+          <p:nvPr/>
+        </p:nvSpPr>
+        <p:spPr bwMode="auto">
+          <a:xfrm>
+            <a:off x="5715388" y="2968265"/>
+            <a:ext cx="381000" cy="381002"/>
+          </a:xfrm>
+          <a:prstGeom prst="leftArrow">
+            <a:avLst/>
+          </a:prstGeom>
+          <a:solidFill>
+            <a:schemeClr val="accent1"/>
+          </a:solidFill>
+          <a:ln>
+            <a:headEnd type="none" w="med" len="med"/>
+            <a:tailEnd type="none" w="med" len="med"/>
+          </a:ln>
+        </p:spPr>
+        <p:style>
+          <a:lnRef idx="0">
+            <a:schemeClr val="accent2"/>
+          </a:lnRef>
+          <a:fillRef idx="3">
+            <a:schemeClr val="accent2"/>
+          </a:fillRef>
+          <a:effectRef idx="3">
+            <a:schemeClr val="accent2"/>
+          </a:effectRef>
+          <a:fontRef idx="minor">
+            <a:schemeClr val="lt1"/>
+          </a:fontRef>
+        </p:style>
+        <p:txBody>
+          <a:bodyPr vert="horz" wrap="square" lIns="91436" tIns="45718" rIns="91436" bIns="45718" numCol="1" rtlCol="0" anchor="ctr" anchorCtr="0" compatLnSpc="1">
+            <a:prstTxWarp prst="textNoShape">
+              <a:avLst/>
+            </a:prstTxWarp>
+          </a:bodyPr>
+          <a:lstStyle/>
+          <a:p>
+            <a:pPr algn="ctr" defTabSz="914099" fontAlgn="base">
+              <a:spcBef>
+                <a:spcPct val="0"/>
+              </a:spcBef>
+              <a:spcAft>
+                <a:spcPct val="0"/>
+              </a:spcAft>
+            </a:pPr>
+            <a:endParaRPr lang="en-US" sz="2300" dirty="0" smtClean="0">
+              <a:solidFill>
+                <a:srgbClr val="FFFFFF"/>
+              </a:solidFill>
+              <a:effectLst>
+                <a:outerShdw blurRad="38100" dist="38100" dir="2700000" algn="tl">
+                  <a:srgbClr val="000000">
+                    <a:alpha val="43137"/>
+                  </a:srgbClr>
+                </a:outerShdw>
+              </a:effectLst>
+              <a:latin typeface="Trebuchet MS" pitchFamily="34" charset="0"/>
+            </a:endParaRPr>
+          </a:p>
+        </p:txBody>
+      </p:sp>
+      <p:cxnSp>
+        <p:nvCxnSpPr>
+          <p:cNvPr id="19" name="Straight Connector 18"/>
+          <p:cNvCxnSpPr>
+            <a:stCxn id="4" idx="0"/>
+          </p:cNvCxnSpPr>
+          <p:nvPr/>
+        </p:nvCxnSpPr>
+        <p:spPr>
+          <a:xfrm flipV="1">
+            <a:off x="2247900" y="2023357"/>
+            <a:ext cx="0" cy="501037"/>
+          </a:xfrm>
+          <a:prstGeom prst="line">
+            <a:avLst/>
+          </a:prstGeom>
+          <a:ln w="38100"/>
+        </p:spPr>
+        <p:style>
+          <a:lnRef idx="1">
+            <a:schemeClr val="accent1"/>
+          </a:lnRef>
+          <a:fillRef idx="0">
+            <a:schemeClr val="accent1"/>
+          </a:fillRef>
+          <a:effectRef idx="0">
+            <a:schemeClr val="accent1"/>
+          </a:effectRef>
+          <a:fontRef idx="minor">
+            <a:schemeClr val="tx1"/>
+          </a:fontRef>
+        </p:style>
+      </p:cxnSp>
+      <p:sp>
+        <p:nvSpPr>
+          <p:cNvPr id="27" name="Rounded Rectangle 26"/>
+          <p:cNvSpPr/>
+          <p:nvPr/>
+        </p:nvSpPr>
+        <p:spPr bwMode="auto">
+          <a:xfrm>
+            <a:off x="228600" y="4572000"/>
+            <a:ext cx="2057400" cy="1219200"/>
+          </a:xfrm>
+          <a:prstGeom prst="roundRect">
+            <a:avLst/>
+          </a:prstGeom>
+          <a:solidFill>
+            <a:schemeClr val="accent1"/>
+          </a:solidFill>
+          <a:ln>
+            <a:headEnd type="none" w="med" len="med"/>
+            <a:tailEnd type="none" w="med" len="med"/>
+          </a:ln>
+        </p:spPr>
+        <p:style>
+          <a:lnRef idx="0">
+            <a:schemeClr val="accent2"/>
+          </a:lnRef>
+          <a:fillRef idx="3">
+            <a:schemeClr val="accent2"/>
+          </a:fillRef>
+          <a:effectRef idx="3">
+            <a:schemeClr val="accent2"/>
+          </a:effectRef>
+          <a:fontRef idx="minor">
+            <a:schemeClr val="lt1"/>
+          </a:fontRef>
+        </p:style>
+        <p:txBody>
+          <a:bodyPr vert="horz" wrap="square" lIns="91436" tIns="45718" rIns="91436" bIns="45718" numCol="1" rtlCol="0" anchor="ctr" anchorCtr="0" compatLnSpc="1">
+            <a:prstTxWarp prst="textNoShape">
+              <a:avLst/>
+            </a:prstTxWarp>
+          </a:bodyPr>
+          <a:lstStyle/>
+          <a:p>
+            <a:pPr algn="ctr" defTabSz="914099" fontAlgn="base">
+              <a:spcBef>
+                <a:spcPct val="0"/>
+              </a:spcBef>
+              <a:spcAft>
+                <a:spcPct val="0"/>
+              </a:spcAft>
+            </a:pPr>
+            <a:r>
+              <a:rPr lang="en-US" sz="2300" dirty="0" smtClean="0">
+                <a:solidFill>
+                  <a:srgbClr val="FFFFFF"/>
+                </a:solidFill>
+                <a:effectLst>
+                  <a:outerShdw blurRad="38100" dist="38100" dir="2700000" algn="tl">
+                    <a:srgbClr val="000000">
+                      <a:alpha val="43137"/>
+                    </a:srgbClr>
+                  </a:outerShdw>
+                </a:effectLst>
+                <a:latin typeface="Trebuchet MS" pitchFamily="34" charset="0"/>
+              </a:rPr>
+              <a:t>Tabular</a:t>
+            </a:r>
+            <a:br>
+              <a:rPr lang="en-US" sz="2300" dirty="0" smtClean="0">
+                <a:solidFill>
+                  <a:srgbClr val="FFFFFF"/>
+                </a:solidFill>
+                <a:effectLst>
+                  <a:outerShdw blurRad="38100" dist="38100" dir="2700000" algn="tl">
+                    <a:srgbClr val="000000">
+                      <a:alpha val="43137"/>
+                    </a:srgbClr>
+                  </a:outerShdw>
+                </a:effectLst>
+                <a:latin typeface="Trebuchet MS" pitchFamily="34" charset="0"/>
+              </a:rPr>
+            </a:br>
+            <a:r>
+              <a:rPr lang="en-US" sz="2300" dirty="0" smtClean="0">
+                <a:solidFill>
+                  <a:srgbClr val="FFFFFF"/>
+                </a:solidFill>
+                <a:effectLst>
+                  <a:outerShdw blurRad="38100" dist="38100" dir="2700000" algn="tl">
+                    <a:srgbClr val="000000">
+                      <a:alpha val="43137"/>
+                    </a:srgbClr>
+                  </a:outerShdw>
+                </a:effectLst>
+                <a:latin typeface="Trebuchet MS" pitchFamily="34" charset="0"/>
+              </a:rPr>
+              <a:t>(CSV)</a:t>
+            </a:r>
+            <a:endParaRPr lang="en-US" sz="2300" dirty="0" smtClean="0">
+              <a:solidFill>
+                <a:srgbClr val="FFFFFF"/>
+              </a:solidFill>
+              <a:effectLst>
+                <a:outerShdw blurRad="38100" dist="38100" dir="2700000" algn="tl">
+                  <a:srgbClr val="000000">
+                    <a:alpha val="43137"/>
+                  </a:srgbClr>
+                </a:outerShdw>
+              </a:effectLst>
+              <a:latin typeface="Trebuchet MS" pitchFamily="34" charset="0"/>
+            </a:endParaRPr>
+          </a:p>
+        </p:txBody>
+      </p:sp>
+      <p:sp>
+        <p:nvSpPr>
+          <p:cNvPr id="28" name="Rounded Rectangle 27"/>
+          <p:cNvSpPr/>
+          <p:nvPr/>
+        </p:nvSpPr>
+        <p:spPr bwMode="auto">
+          <a:xfrm>
+            <a:off x="2480675" y="4572000"/>
+            <a:ext cx="2057400" cy="1219200"/>
+          </a:xfrm>
+          <a:prstGeom prst="roundRect">
+            <a:avLst/>
+          </a:prstGeom>
+          <a:solidFill>
+            <a:schemeClr val="accent1"/>
+          </a:solidFill>
+          <a:ln>
+            <a:headEnd type="none" w="med" len="med"/>
+            <a:tailEnd type="none" w="med" len="med"/>
+          </a:ln>
+        </p:spPr>
+        <p:style>
+          <a:lnRef idx="0">
+            <a:schemeClr val="accent2"/>
+          </a:lnRef>
+          <a:fillRef idx="3">
+            <a:schemeClr val="accent2"/>
+          </a:fillRef>
+          <a:effectRef idx="3">
+            <a:schemeClr val="accent2"/>
+          </a:effectRef>
+          <a:fontRef idx="minor">
+            <a:schemeClr val="lt1"/>
+          </a:fontRef>
+        </p:style>
+        <p:txBody>
+          <a:bodyPr vert="horz" wrap="square" lIns="91436" tIns="45718" rIns="91436" bIns="45718" numCol="1" rtlCol="0" anchor="ctr" anchorCtr="0" compatLnSpc="1">
+            <a:prstTxWarp prst="textNoShape">
+              <a:avLst/>
+            </a:prstTxWarp>
+          </a:bodyPr>
+          <a:lstStyle/>
+          <a:p>
+            <a:pPr algn="ctr" defTabSz="914099" fontAlgn="base">
+              <a:spcBef>
+                <a:spcPct val="0"/>
+              </a:spcBef>
+              <a:spcAft>
+                <a:spcPct val="0"/>
+              </a:spcAft>
+            </a:pPr>
+            <a:r>
+              <a:rPr lang="en-US" sz="2300" dirty="0" smtClean="0">
+                <a:solidFill>
+                  <a:srgbClr val="FFFFFF"/>
+                </a:solidFill>
+                <a:effectLst>
+                  <a:outerShdw blurRad="38100" dist="38100" dir="2700000" algn="tl">
+                    <a:srgbClr val="000000">
+                      <a:alpha val="43137"/>
+                    </a:srgbClr>
+                  </a:outerShdw>
+                </a:effectLst>
+                <a:latin typeface="Trebuchet MS" pitchFamily="34" charset="0"/>
+              </a:rPr>
+              <a:t>Document</a:t>
+            </a:r>
+            <a:br>
+              <a:rPr lang="en-US" sz="2300" dirty="0" smtClean="0">
+                <a:solidFill>
+                  <a:srgbClr val="FFFFFF"/>
+                </a:solidFill>
+                <a:effectLst>
+                  <a:outerShdw blurRad="38100" dist="38100" dir="2700000" algn="tl">
+                    <a:srgbClr val="000000">
+                      <a:alpha val="43137"/>
+                    </a:srgbClr>
+                  </a:outerShdw>
+                </a:effectLst>
+                <a:latin typeface="Trebuchet MS" pitchFamily="34" charset="0"/>
+              </a:rPr>
+            </a:br>
+            <a:r>
+              <a:rPr lang="en-US" sz="2300" dirty="0" smtClean="0">
+                <a:solidFill>
+                  <a:srgbClr val="FFFFFF"/>
+                </a:solidFill>
+                <a:effectLst>
+                  <a:outerShdw blurRad="38100" dist="38100" dir="2700000" algn="tl">
+                    <a:srgbClr val="000000">
+                      <a:alpha val="43137"/>
+                    </a:srgbClr>
+                  </a:outerShdw>
+                </a:effectLst>
+                <a:latin typeface="Trebuchet MS" pitchFamily="34" charset="0"/>
+              </a:rPr>
+              <a:t>(JSON)</a:t>
+            </a:r>
+            <a:endParaRPr lang="en-US" sz="2300" dirty="0" smtClean="0">
+              <a:solidFill>
+                <a:srgbClr val="FFFFFF"/>
+              </a:solidFill>
+              <a:effectLst>
+                <a:outerShdw blurRad="38100" dist="38100" dir="2700000" algn="tl">
+                  <a:srgbClr val="000000">
+                    <a:alpha val="43137"/>
+                  </a:srgbClr>
+                </a:outerShdw>
+              </a:effectLst>
+              <a:latin typeface="Trebuchet MS" pitchFamily="34" charset="0"/>
+            </a:endParaRPr>
+          </a:p>
+        </p:txBody>
+      </p:sp>
+      <p:sp>
+        <p:nvSpPr>
+          <p:cNvPr id="25" name="TextBox 24"/>
+          <p:cNvSpPr txBox="1"/>
+          <p:nvPr/>
+        </p:nvSpPr>
+        <p:spPr>
+          <a:xfrm>
+            <a:off x="3048000" y="1652981"/>
+            <a:ext cx="3771032" cy="369332"/>
+          </a:xfrm>
+          <a:prstGeom prst="rect">
+            <a:avLst/>
+          </a:prstGeom>
+          <a:noFill/>
+        </p:spPr>
+        <p:txBody>
+          <a:bodyPr wrap="none" rtlCol="0">
+            <a:spAutoFit/>
+          </a:bodyPr>
+          <a:lstStyle/>
+          <a:p>
             <a:r>
               <a:rPr lang="en-US" dirty="0" smtClean="0"/>
-              <a:t>Handles data representation </a:t>
-            </a:r>
+              <a:t>Dynamic Schema (Derived from Input)</a:t>
+            </a:r>
+            <a:endParaRPr lang="en-US" dirty="0"/>
+          </a:p>
+        </p:txBody>
+      </p:sp>
+      <p:sp>
+        <p:nvSpPr>
+          <p:cNvPr id="29" name="TextBox 28"/>
+          <p:cNvSpPr txBox="1"/>
+          <p:nvPr/>
+        </p:nvSpPr>
+        <p:spPr>
+          <a:xfrm>
+            <a:off x="3782999" y="3886200"/>
+            <a:ext cx="2193421" cy="369332"/>
+          </a:xfrm>
+          <a:prstGeom prst="rect">
+            <a:avLst/>
+          </a:prstGeom>
+          <a:noFill/>
+        </p:spPr>
+        <p:txBody>
+          <a:bodyPr wrap="none" rtlCol="0">
+            <a:spAutoFit/>
+          </a:bodyPr>
+          <a:lstStyle/>
+          <a:p>
             <a:r>
               <a:rPr lang="en-US" dirty="0" smtClean="0"/>
-              <a:t>for access in storage.</a:t>
-            </a:r>
-          </a:p>
-          <a:p>
-            <a:pPr lvl="1"/>
-            <a:r>
-              <a:rPr lang="en-US" dirty="0" smtClean="0"/>
-              <a:t>Document Oriented (JSON, BSON)</a:t>
-            </a:r>
-          </a:p>
-          <a:p>
-            <a:pPr lvl="1"/>
-            <a:r>
-              <a:rPr lang="en-US" dirty="0" smtClean="0"/>
-              <a:t>Column Base (CSV, PSV, TSV)</a:t>
-            </a:r>
-          </a:p>
-          <a:p>
-            <a:pPr lvl="1"/>
-            <a:r>
-              <a:rPr lang="en-US" dirty="0" smtClean="0"/>
-              <a:t>RDBMS </a:t>
-            </a:r>
-            <a:r>
-              <a:rPr lang="en-US" dirty="0" smtClean="0"/>
-              <a:t>(fixed binary records)</a:t>
-            </a:r>
-          </a:p>
-          <a:p>
-            <a:pPr lvl="1"/>
-            <a:endParaRPr lang="en-US" dirty="0" smtClean="0"/>
-          </a:p>
-          <a:p>
-            <a:pPr lvl="1"/>
-            <a:endParaRPr lang="en-US" dirty="0" smtClean="0">
+              <a:t>Schema Pre-specified</a:t>
+            </a:r>
+            <a:endParaRPr lang="en-US" dirty="0"/>
+          </a:p>
+        </p:txBody>
+      </p:sp>
+      <p:cxnSp>
+        <p:nvCxnSpPr>
+          <p:cNvPr id="31" name="Curved Connector 30"/>
+          <p:cNvCxnSpPr>
+            <a:stCxn id="29" idx="1"/>
+          </p:cNvCxnSpPr>
+          <p:nvPr/>
+        </p:nvCxnSpPr>
+        <p:spPr>
+          <a:xfrm rot="10800000">
+            <a:off x="3467297" y="3349268"/>
+            <a:ext cx="315703" cy="721598"/>
+          </a:xfrm>
+          <a:prstGeom prst="curvedConnector2">
+            <a:avLst/>
+          </a:prstGeom>
+          <a:ln w="25400">
+            <a:tailEnd type="arrow"/>
+          </a:ln>
+        </p:spPr>
+        <p:style>
+          <a:lnRef idx="1">
+            <a:schemeClr val="accent1"/>
+          </a:lnRef>
+          <a:fillRef idx="0">
+            <a:schemeClr val="accent1"/>
+          </a:fillRef>
+          <a:effectRef idx="0">
+            <a:schemeClr val="accent1"/>
+          </a:effectRef>
+          <a:fontRef idx="minor">
+            <a:schemeClr val="tx1"/>
+          </a:fontRef>
+        </p:style>
+      </p:cxnSp>
+      <p:sp>
+        <p:nvSpPr>
+          <p:cNvPr id="33" name="Left Arrow 32"/>
+          <p:cNvSpPr/>
+          <p:nvPr/>
+        </p:nvSpPr>
+        <p:spPr bwMode="auto">
+          <a:xfrm rot="6879389">
+            <a:off x="1541012" y="3953748"/>
+            <a:ext cx="765554" cy="316468"/>
+          </a:xfrm>
+          <a:prstGeom prst="leftArrow">
+            <a:avLst/>
+          </a:prstGeom>
+          <a:solidFill>
+            <a:schemeClr val="accent1"/>
+          </a:solidFill>
+          <a:ln>
+            <a:headEnd type="none" w="med" len="med"/>
+            <a:tailEnd type="none" w="med" len="med"/>
+          </a:ln>
+        </p:spPr>
+        <p:style>
+          <a:lnRef idx="0">
+            <a:schemeClr val="accent2"/>
+          </a:lnRef>
+          <a:fillRef idx="3">
+            <a:schemeClr val="accent2"/>
+          </a:fillRef>
+          <a:effectRef idx="3">
+            <a:schemeClr val="accent2"/>
+          </a:effectRef>
+          <a:fontRef idx="minor">
+            <a:schemeClr val="lt1"/>
+          </a:fontRef>
+        </p:style>
+        <p:txBody>
+          <a:bodyPr vert="horz" wrap="square" lIns="91436" tIns="45718" rIns="91436" bIns="45718" numCol="1" rtlCol="0" anchor="ctr" anchorCtr="0" compatLnSpc="1">
+            <a:prstTxWarp prst="textNoShape">
+              <a:avLst/>
+            </a:prstTxWarp>
+          </a:bodyPr>
+          <a:lstStyle/>
+          <a:p>
+            <a:pPr algn="ctr" defTabSz="914099" fontAlgn="base">
+              <a:spcBef>
+                <a:spcPct val="0"/>
+              </a:spcBef>
+              <a:spcAft>
+                <a:spcPct val="0"/>
+              </a:spcAft>
+            </a:pPr>
+            <a:endParaRPr lang="en-US" sz="2300" dirty="0" smtClean="0">
               <a:solidFill>
-                <a:schemeClr val="tx2">
-                  <a:lumMod val="50000"/>
-                </a:schemeClr>
+                <a:srgbClr val="FFFFFF"/>
               </a:solidFill>
+              <a:effectLst>
+                <a:outerShdw blurRad="38100" dist="38100" dir="2700000" algn="tl">
+                  <a:srgbClr val="000000">
+                    <a:alpha val="43137"/>
+                  </a:srgbClr>
+                </a:outerShdw>
+              </a:effectLst>
+              <a:latin typeface="Trebuchet MS" pitchFamily="34" charset="0"/>
             </a:endParaRPr>
           </a:p>
-          <a:p>
-            <a:endParaRPr lang="en-US" dirty="0" smtClean="0">
+        </p:txBody>
+      </p:sp>
+      <p:sp>
+        <p:nvSpPr>
+          <p:cNvPr id="34" name="Left Arrow 33"/>
+          <p:cNvSpPr/>
+          <p:nvPr/>
+        </p:nvSpPr>
+        <p:spPr bwMode="auto">
+          <a:xfrm rot="3593580">
+            <a:off x="2277386" y="3980689"/>
+            <a:ext cx="807968" cy="316468"/>
+          </a:xfrm>
+          <a:prstGeom prst="leftArrow">
+            <a:avLst/>
+          </a:prstGeom>
+          <a:solidFill>
+            <a:schemeClr val="accent1"/>
+          </a:solidFill>
+          <a:ln>
+            <a:headEnd type="none" w="med" len="med"/>
+            <a:tailEnd type="none" w="med" len="med"/>
+          </a:ln>
+        </p:spPr>
+        <p:style>
+          <a:lnRef idx="0">
+            <a:schemeClr val="accent2"/>
+          </a:lnRef>
+          <a:fillRef idx="3">
+            <a:schemeClr val="accent2"/>
+          </a:fillRef>
+          <a:effectRef idx="3">
+            <a:schemeClr val="accent2"/>
+          </a:effectRef>
+          <a:fontRef idx="minor">
+            <a:schemeClr val="lt1"/>
+          </a:fontRef>
+        </p:style>
+        <p:txBody>
+          <a:bodyPr vert="horz" wrap="square" lIns="91436" tIns="45718" rIns="91436" bIns="45718" numCol="1" rtlCol="0" anchor="ctr" anchorCtr="0" compatLnSpc="1">
+            <a:prstTxWarp prst="textNoShape">
+              <a:avLst/>
+            </a:prstTxWarp>
+          </a:bodyPr>
+          <a:lstStyle/>
+          <a:p>
+            <a:pPr algn="ctr" defTabSz="914099" fontAlgn="base">
+              <a:spcBef>
+                <a:spcPct val="0"/>
+              </a:spcBef>
+              <a:spcAft>
+                <a:spcPct val="0"/>
+              </a:spcAft>
+            </a:pPr>
+            <a:endParaRPr lang="en-US" sz="2300" dirty="0" smtClean="0">
               <a:solidFill>
-                <a:schemeClr val="tx2">
-                  <a:lumMod val="50000"/>
-                </a:schemeClr>
+                <a:srgbClr val="FFFFFF"/>
               </a:solidFill>
-            </a:endParaRPr>
-          </a:p>
-          <a:p>
-            <a:endParaRPr lang="en-US" dirty="0" smtClean="0">
-              <a:solidFill>
-                <a:schemeClr val="tx2">
-                  <a:lumMod val="50000"/>
-                </a:schemeClr>
-              </a:solidFill>
+              <a:effectLst>
+                <a:outerShdw blurRad="38100" dist="38100" dir="2700000" algn="tl">
+                  <a:srgbClr val="000000">
+                    <a:alpha val="43137"/>
+                  </a:srgbClr>
+                </a:outerShdw>
+              </a:effectLst>
+              <a:latin typeface="Trebuchet MS" pitchFamily="34" charset="0"/>
             </a:endParaRPr>
           </a:p>
         </p:txBody>
@@ -6279,7 +7508,7 @@
     </p:spTree>
     <p:extLst>
       <p:ext uri="{BB962C8B-B14F-4D97-AF65-F5344CB8AC3E}">
-        <p14:creationId xmlns:p14="http://schemas.microsoft.com/office/powerpoint/2010/main" val="38999932"/>
+        <p14:creationId xmlns:p14="http://schemas.microsoft.com/office/powerpoint/2010/main" val="2674252949"/>
       </p:ext>
     </p:extLst>
   </p:cSld>
@@ -6326,22 +7555,19 @@
             <p:ph type="title"/>
           </p:nvPr>
         </p:nvSpPr>
-        <p:spPr/>
+        <p:spPr>
+          <a:xfrm>
+            <a:off x="381000" y="230188"/>
+            <a:ext cx="8382000" cy="1329595"/>
+          </a:xfrm>
+        </p:spPr>
         <p:txBody>
           <a:bodyPr/>
           <a:lstStyle/>
           <a:p>
             <a:r>
               <a:rPr lang="en-US" dirty="0" smtClean="0"/>
-              <a:t>Stages (</a:t>
-            </a:r>
-            <a:r>
-              <a:rPr lang="en-US" dirty="0" err="1" smtClean="0"/>
-              <a:t>cont</a:t>
-            </a:r>
-            <a:r>
-              <a:rPr lang="en-US" dirty="0" smtClean="0"/>
-              <a:t>)</a:t>
+              <a:t>Input Stage – Tabular Format (e.g., CSV)</a:t>
             </a:r>
             <a:endParaRPr lang="en-US" dirty="0"/>
           </a:p>
@@ -6359,8 +7585,8 @@
         </p:nvSpPr>
         <p:spPr>
           <a:xfrm>
-            <a:off x="381000" y="1096423"/>
-            <a:ext cx="8382000" cy="5250668"/>
+            <a:off x="381000" y="1676400"/>
+            <a:ext cx="8382000" cy="4343400"/>
           </a:xfrm>
         </p:spPr>
         <p:txBody>
@@ -6375,23 +7601,37 @@
                   </a:schemeClr>
                 </a:solidFill>
               </a:rPr>
-              <a:t>Storage</a:t>
-            </a:r>
-            <a:endParaRPr lang="en-US" dirty="0" smtClean="0"/>
-          </a:p>
-          <a:p>
-            <a:pPr marL="0" indent="0">
+              <a:t>Predefined Schema</a:t>
+            </a:r>
+            <a:endParaRPr lang="en-US" dirty="0" smtClean="0">
+              <a:solidFill>
+                <a:schemeClr val="tx2">
+                  <a:lumMod val="50000"/>
+                </a:schemeClr>
+              </a:solidFill>
+            </a:endParaRPr>
+          </a:p>
+          <a:p>
+            <a:pPr lvl="1"/>
+            <a:r>
+              <a:rPr lang="en-US" dirty="0" smtClean="0"/>
+              <a:t>File with Matching Header</a:t>
+            </a:r>
+          </a:p>
+          <a:p>
+            <a:pPr lvl="1"/>
+            <a:r>
+              <a:rPr lang="en-US" dirty="0" smtClean="0"/>
+              <a:t>File with no matching header with matching number of columns.</a:t>
+            </a:r>
+          </a:p>
+          <a:p>
+            <a:pPr marL="517525" lvl="1" indent="0">
               <a:buNone/>
             </a:pPr>
             <a:endParaRPr lang="en-US" dirty="0" smtClean="0"/>
           </a:p>
           <a:p>
-            <a:pPr marL="0" indent="0">
-              <a:buNone/>
-            </a:pPr>
-            <a:endParaRPr lang="en-US" dirty="0" smtClean="0"/>
-          </a:p>
-          <a:p>
             <a:r>
               <a:rPr lang="en-US" dirty="0" smtClean="0">
                 <a:solidFill>
@@ -6400,13 +7640,8 @@
                   </a:schemeClr>
                 </a:solidFill>
               </a:rPr>
-              <a:t>Clustering</a:t>
-            </a:r>
-          </a:p>
-          <a:p>
-            <a:pPr marL="0" indent="0">
-              <a:buNone/>
-            </a:pPr>
+              <a:t>No Defined Schema</a:t>
+            </a:r>
             <a:endParaRPr lang="en-US" dirty="0">
               <a:solidFill>
                 <a:schemeClr val="tx2">
@@ -6414,6 +7649,442 @@
                 </a:schemeClr>
               </a:solidFill>
             </a:endParaRPr>
+          </a:p>
+          <a:p>
+            <a:pPr lvl="1"/>
+            <a:r>
+              <a:rPr lang="en-US" dirty="0"/>
+              <a:t>File with </a:t>
+            </a:r>
+            <a:r>
+              <a:rPr lang="en-US" dirty="0" smtClean="0"/>
+              <a:t>Header – Schema dynamically created</a:t>
+            </a:r>
+            <a:endParaRPr lang="en-US" dirty="0">
+              <a:solidFill>
+                <a:schemeClr val="tx2">
+                  <a:lumMod val="50000"/>
+                </a:schemeClr>
+              </a:solidFill>
+            </a:endParaRPr>
+          </a:p>
+          <a:p>
+            <a:pPr lvl="1"/>
+            <a:endParaRPr lang="en-US" dirty="0" smtClean="0"/>
+          </a:p>
+          <a:p>
+            <a:pPr marL="517525" lvl="1" indent="0">
+              <a:buNone/>
+            </a:pPr>
+            <a:endParaRPr lang="en-US" dirty="0" smtClean="0">
+              <a:solidFill>
+                <a:schemeClr val="tx2">
+                  <a:lumMod val="50000"/>
+                </a:schemeClr>
+              </a:solidFill>
+            </a:endParaRPr>
+          </a:p>
+          <a:p>
+            <a:endParaRPr lang="en-US" dirty="0" smtClean="0">
+              <a:solidFill>
+                <a:schemeClr val="tx2">
+                  <a:lumMod val="50000"/>
+                </a:schemeClr>
+              </a:solidFill>
+            </a:endParaRPr>
+          </a:p>
+          <a:p>
+            <a:endParaRPr lang="en-US" dirty="0" smtClean="0">
+              <a:solidFill>
+                <a:schemeClr val="tx2">
+                  <a:lumMod val="50000"/>
+                </a:schemeClr>
+              </a:solidFill>
+            </a:endParaRPr>
+          </a:p>
+        </p:txBody>
+      </p:sp>
+    </p:spTree>
+    <p:extLst>
+      <p:ext uri="{BB962C8B-B14F-4D97-AF65-F5344CB8AC3E}">
+        <p14:creationId xmlns:p14="http://schemas.microsoft.com/office/powerpoint/2010/main" val="3627869168"/>
+      </p:ext>
+    </p:extLst>
+  </p:cSld>
+  <p:clrMapOvr>
+    <a:masterClrMapping/>
+  </p:clrMapOvr>
+  <p:transition>
+    <p:fade/>
+  </p:transition>
+  <p:timing>
+    <p:tnLst>
+      <p:par>
+        <p:cTn id="1" dur="indefinite" restart="never" nodeType="tmRoot"/>
+      </p:par>
+    </p:tnLst>
+  </p:timing>
+</p:sld>
+</file>
+
+<file path=ppt/slides/slide6.xml><?xml version="1.0" encoding="utf-8"?>
+<p:sld xmlns:a="http://schemas.openxmlformats.org/drawingml/2006/main" xmlns:r="http://schemas.openxmlformats.org/officeDocument/2006/relationships" xmlns:p="http://schemas.openxmlformats.org/presentationml/2006/main">
+  <p:cSld>
+    <p:spTree>
+      <p:nvGrpSpPr>
+        <p:cNvPr id="1" name=""/>
+        <p:cNvGrpSpPr/>
+        <p:nvPr/>
+      </p:nvGrpSpPr>
+      <p:grpSpPr>
+        <a:xfrm>
+          <a:off x="0" y="0"/>
+          <a:ext cx="0" cy="0"/>
+          <a:chOff x="0" y="0"/>
+          <a:chExt cx="0" cy="0"/>
+        </a:xfrm>
+      </p:grpSpPr>
+      <p:sp>
+        <p:nvSpPr>
+          <p:cNvPr id="2" name="Title 1"/>
+          <p:cNvSpPr>
+            <a:spLocks noGrp="1"/>
+          </p:cNvSpPr>
+          <p:nvPr>
+            <p:ph type="title"/>
+          </p:nvPr>
+        </p:nvSpPr>
+        <p:spPr/>
+        <p:txBody>
+          <a:bodyPr/>
+          <a:lstStyle/>
+          <a:p>
+            <a:r>
+              <a:rPr lang="en-US" dirty="0" smtClean="0"/>
+              <a:t>Stages (</a:t>
+            </a:r>
+            <a:r>
+              <a:rPr lang="en-US" dirty="0" err="1" smtClean="0"/>
+              <a:t>cont</a:t>
+            </a:r>
+            <a:r>
+              <a:rPr lang="en-US" dirty="0" smtClean="0"/>
+              <a:t>)</a:t>
+            </a:r>
+            <a:endParaRPr lang="en-US" dirty="0"/>
+          </a:p>
+        </p:txBody>
+      </p:sp>
+      <p:sp>
+        <p:nvSpPr>
+          <p:cNvPr id="3" name="Text Placeholder 2"/>
+          <p:cNvSpPr>
+            <a:spLocks noGrp="1"/>
+          </p:cNvSpPr>
+          <p:nvPr>
+            <p:ph type="body" sz="quarter" idx="10"/>
+          </p:nvPr>
+        </p:nvSpPr>
+        <p:spPr>
+          <a:xfrm>
+            <a:off x="381000" y="1096423"/>
+            <a:ext cx="8382000" cy="7263527"/>
+          </a:xfrm>
+        </p:spPr>
+        <p:txBody>
+          <a:bodyPr/>
+          <a:lstStyle/>
+          <a:p>
+            <a:r>
+              <a:rPr lang="en-US" dirty="0" smtClean="0">
+                <a:solidFill>
+                  <a:schemeClr val="tx2">
+                    <a:lumMod val="50000"/>
+                  </a:schemeClr>
+                </a:solidFill>
+              </a:rPr>
+              <a:t>Data Model</a:t>
+            </a:r>
+          </a:p>
+          <a:p>
+            <a:pPr lvl="1"/>
+            <a:r>
+              <a:rPr lang="en-US" dirty="0" smtClean="0">
+                <a:solidFill>
+                  <a:schemeClr val="tx1">
+                    <a:lumMod val="95000"/>
+                  </a:schemeClr>
+                </a:solidFill>
+              </a:rPr>
+              <a:t>Transform from input formats to internal representation</a:t>
+            </a:r>
+          </a:p>
+          <a:p>
+            <a:pPr lvl="1"/>
+            <a:r>
+              <a:rPr lang="en-US" dirty="0" smtClean="0">
+                <a:solidFill>
+                  <a:schemeClr val="tx1">
+                    <a:lumMod val="95000"/>
+                  </a:schemeClr>
+                </a:solidFill>
+              </a:rPr>
+              <a:t>Data Wrangling</a:t>
+            </a:r>
+          </a:p>
+          <a:p>
+            <a:pPr lvl="1"/>
+            <a:r>
+              <a:rPr lang="en-US" dirty="0" smtClean="0">
+                <a:solidFill>
+                  <a:schemeClr val="tx1">
+                    <a:lumMod val="95000"/>
+                  </a:schemeClr>
+                </a:solidFill>
+              </a:rPr>
+              <a:t>Data Manipulation</a:t>
+            </a:r>
+          </a:p>
+          <a:p>
+            <a:pPr marL="0" indent="0">
+              <a:buNone/>
+            </a:pPr>
+            <a:endParaRPr lang="en-US" dirty="0" smtClean="0"/>
+          </a:p>
+          <a:p>
+            <a:r>
+              <a:rPr lang="en-US" dirty="0" smtClean="0">
+                <a:solidFill>
+                  <a:schemeClr val="tx2">
+                    <a:lumMod val="50000"/>
+                  </a:schemeClr>
+                </a:solidFill>
+              </a:rPr>
+              <a:t>Data Store</a:t>
+            </a:r>
+          </a:p>
+          <a:p>
+            <a:pPr lvl="1"/>
+            <a:r>
+              <a:rPr lang="en-US" dirty="0" smtClean="0"/>
+              <a:t>Handles data representation for access in storage.</a:t>
+            </a:r>
+          </a:p>
+          <a:p>
+            <a:pPr lvl="1"/>
+            <a:r>
+              <a:rPr lang="en-US" dirty="0" smtClean="0"/>
+              <a:t>Document Oriented (JSON, BSON)</a:t>
+            </a:r>
+          </a:p>
+          <a:p>
+            <a:pPr lvl="1"/>
+            <a:r>
+              <a:rPr lang="en-US" dirty="0" smtClean="0"/>
+              <a:t>Column Base (CSV, PSV, TSV)</a:t>
+            </a:r>
+          </a:p>
+          <a:p>
+            <a:pPr lvl="1"/>
+            <a:r>
+              <a:rPr lang="en-US" dirty="0" smtClean="0"/>
+              <a:t>RDBMS (fixed binary records)</a:t>
+            </a:r>
+          </a:p>
+          <a:p>
+            <a:pPr lvl="1"/>
+            <a:endParaRPr lang="en-US" dirty="0" smtClean="0"/>
+          </a:p>
+          <a:p>
+            <a:pPr lvl="1"/>
+            <a:endParaRPr lang="en-US" dirty="0" smtClean="0">
+              <a:solidFill>
+                <a:schemeClr val="tx2">
+                  <a:lumMod val="50000"/>
+                </a:schemeClr>
+              </a:solidFill>
+            </a:endParaRPr>
+          </a:p>
+          <a:p>
+            <a:endParaRPr lang="en-US" dirty="0" smtClean="0">
+              <a:solidFill>
+                <a:schemeClr val="tx2">
+                  <a:lumMod val="50000"/>
+                </a:schemeClr>
+              </a:solidFill>
+            </a:endParaRPr>
+          </a:p>
+          <a:p>
+            <a:endParaRPr lang="en-US" dirty="0" smtClean="0">
+              <a:solidFill>
+                <a:schemeClr val="tx2">
+                  <a:lumMod val="50000"/>
+                </a:schemeClr>
+              </a:solidFill>
+            </a:endParaRPr>
+          </a:p>
+        </p:txBody>
+      </p:sp>
+    </p:spTree>
+    <p:extLst>
+      <p:ext uri="{BB962C8B-B14F-4D97-AF65-F5344CB8AC3E}">
+        <p14:creationId xmlns:p14="http://schemas.microsoft.com/office/powerpoint/2010/main" val="38999932"/>
+      </p:ext>
+    </p:extLst>
+  </p:cSld>
+  <p:clrMapOvr>
+    <a:masterClrMapping/>
+  </p:clrMapOvr>
+  <p:transition>
+    <p:fade/>
+  </p:transition>
+  <p:timing>
+    <p:tnLst>
+      <p:par>
+        <p:cTn id="1" dur="indefinite" restart="never" nodeType="tmRoot"/>
+      </p:par>
+    </p:tnLst>
+  </p:timing>
+</p:sld>
+</file>
+
+<file path=ppt/slides/slide7.xml><?xml version="1.0" encoding="utf-8"?>
+<p:sld xmlns:a="http://schemas.openxmlformats.org/drawingml/2006/main" xmlns:r="http://schemas.openxmlformats.org/officeDocument/2006/relationships" xmlns:p="http://schemas.openxmlformats.org/presentationml/2006/main">
+  <p:cSld>
+    <p:spTree>
+      <p:nvGrpSpPr>
+        <p:cNvPr id="1" name=""/>
+        <p:cNvGrpSpPr/>
+        <p:nvPr/>
+      </p:nvGrpSpPr>
+      <p:grpSpPr>
+        <a:xfrm>
+          <a:off x="0" y="0"/>
+          <a:ext cx="0" cy="0"/>
+          <a:chOff x="0" y="0"/>
+          <a:chExt cx="0" cy="0"/>
+        </a:xfrm>
+      </p:grpSpPr>
+      <p:sp>
+        <p:nvSpPr>
+          <p:cNvPr id="2" name="Title 1"/>
+          <p:cNvSpPr>
+            <a:spLocks noGrp="1"/>
+          </p:cNvSpPr>
+          <p:nvPr>
+            <p:ph type="title"/>
+          </p:nvPr>
+        </p:nvSpPr>
+        <p:spPr/>
+        <p:txBody>
+          <a:bodyPr/>
+          <a:lstStyle/>
+          <a:p>
+            <a:r>
+              <a:rPr lang="en-US" dirty="0" smtClean="0"/>
+              <a:t>Stages (</a:t>
+            </a:r>
+            <a:r>
+              <a:rPr lang="en-US" dirty="0" err="1" smtClean="0"/>
+              <a:t>cont</a:t>
+            </a:r>
+            <a:r>
+              <a:rPr lang="en-US" dirty="0" smtClean="0"/>
+              <a:t>)</a:t>
+            </a:r>
+            <a:endParaRPr lang="en-US" dirty="0"/>
+          </a:p>
+        </p:txBody>
+      </p:sp>
+      <p:sp>
+        <p:nvSpPr>
+          <p:cNvPr id="3" name="Text Placeholder 2"/>
+          <p:cNvSpPr>
+            <a:spLocks noGrp="1"/>
+          </p:cNvSpPr>
+          <p:nvPr>
+            <p:ph type="body" sz="quarter" idx="10"/>
+          </p:nvPr>
+        </p:nvSpPr>
+        <p:spPr>
+          <a:xfrm>
+            <a:off x="381000" y="1096423"/>
+            <a:ext cx="8382000" cy="5380577"/>
+          </a:xfrm>
+        </p:spPr>
+        <p:txBody>
+          <a:bodyPr/>
+          <a:lstStyle/>
+          <a:p>
+            <a:r>
+              <a:rPr lang="en-US" dirty="0" smtClean="0">
+                <a:solidFill>
+                  <a:schemeClr val="tx2">
+                    <a:lumMod val="50000"/>
+                  </a:schemeClr>
+                </a:solidFill>
+              </a:rPr>
+              <a:t>Storage</a:t>
+            </a:r>
+          </a:p>
+          <a:p>
+            <a:pPr lvl="1"/>
+            <a:r>
+              <a:rPr lang="en-US" dirty="0" smtClean="0"/>
+              <a:t>Handles physical storage (on disk) of data</a:t>
+            </a:r>
+          </a:p>
+          <a:p>
+            <a:pPr lvl="1"/>
+            <a:r>
+              <a:rPr lang="en-US" dirty="0" smtClean="0"/>
+              <a:t>Single Monolithic File Storage</a:t>
+            </a:r>
+          </a:p>
+          <a:p>
+            <a:pPr lvl="1"/>
+            <a:r>
+              <a:rPr lang="en-US" dirty="0" smtClean="0"/>
+              <a:t>Multiple File Storage for </a:t>
+            </a:r>
+            <a:r>
+              <a:rPr lang="en-US" dirty="0" err="1" smtClean="0"/>
+              <a:t>Sharding</a:t>
+            </a:r>
+            <a:endParaRPr lang="en-US" dirty="0" smtClean="0"/>
+          </a:p>
+          <a:p>
+            <a:pPr marL="0" indent="0">
+              <a:buNone/>
+            </a:pPr>
+            <a:endParaRPr lang="en-US" dirty="0" smtClean="0"/>
+          </a:p>
+          <a:p>
+            <a:r>
+              <a:rPr lang="en-US" dirty="0" smtClean="0">
+                <a:solidFill>
+                  <a:schemeClr val="tx2">
+                    <a:lumMod val="50000"/>
+                  </a:schemeClr>
+                </a:solidFill>
+              </a:rPr>
+              <a:t>Clustering</a:t>
+            </a:r>
+          </a:p>
+          <a:p>
+            <a:pPr lvl="1"/>
+            <a:r>
+              <a:rPr lang="en-US" dirty="0" smtClean="0"/>
+              <a:t>Handles Processes and Storage across Multiple Processors and Storage Devices.</a:t>
+            </a:r>
+          </a:p>
+          <a:p>
+            <a:pPr lvl="1"/>
+            <a:r>
+              <a:rPr lang="en-US" dirty="0" smtClean="0"/>
+              <a:t>Interconnected using Micro-Services</a:t>
+            </a:r>
+            <a:endParaRPr lang="en-US" dirty="0" smtClean="0"/>
           </a:p>
           <a:p>
             <a:pPr marL="0" indent="0">
@@ -6438,9 +8109,6 @@
               </a:rPr>
               <a:t>Replication</a:t>
             </a:r>
-          </a:p>
-          <a:p>
-            <a:pPr lvl="1"/>
             <a:endParaRPr lang="en-US" dirty="0" smtClean="0">
               <a:solidFill>
                 <a:schemeClr val="tx2">

</xml_diff>